<commit_message>
Finish blog post the naive bayes assumption
</commit_message>
<xml_diff>
--- a/_diagrams/the-naive-bayes-assumption/the-naive-bayes-assumption.pptx
+++ b/_diagrams/the-naive-bayes-assumption/the-naive-bayes-assumption.pptx
@@ -239,7 +239,7 @@
           </c:val>
           <c:extLst>
             <c:ext xmlns:c16="http://schemas.microsoft.com/office/drawing/2014/chart" uri="{C3380CC4-5D6E-409C-BE32-E72D297353CC}">
-              <c16:uniqueId val="{00000000-9E91-4AFB-B68B-42B3D50BAF39}"/>
+              <c16:uniqueId val="{00000000-BBF3-41FB-9C0A-D7ECDBCA6DE3}"/>
             </c:ext>
           </c:extLst>
         </c:ser>
@@ -358,7 +358,7 @@
           </c:val>
           <c:extLst>
             <c:ext xmlns:c16="http://schemas.microsoft.com/office/drawing/2014/chart" uri="{C3380CC4-5D6E-409C-BE32-E72D297353CC}">
-              <c16:uniqueId val="{00000001-9E91-4AFB-B68B-42B3D50BAF39}"/>
+              <c16:uniqueId val="{00000001-BBF3-41FB-9C0A-D7ECDBCA6DE3}"/>
             </c:ext>
           </c:extLst>
         </c:ser>
@@ -493,7 +493,7 @@
           <c:smooth val="1"/>
           <c:extLst>
             <c:ext xmlns:c16="http://schemas.microsoft.com/office/drawing/2014/chart" uri="{C3380CC4-5D6E-409C-BE32-E72D297353CC}">
-              <c16:uniqueId val="{00000002-9E91-4AFB-B68B-42B3D50BAF39}"/>
+              <c16:uniqueId val="{00000002-BBF3-41FB-9C0A-D7ECDBCA6DE3}"/>
             </c:ext>
           </c:extLst>
         </c:ser>
@@ -616,7 +616,7 @@
           <c:smooth val="1"/>
           <c:extLst>
             <c:ext xmlns:c16="http://schemas.microsoft.com/office/drawing/2014/chart" uri="{C3380CC4-5D6E-409C-BE32-E72D297353CC}">
-              <c16:uniqueId val="{00000003-9E91-4AFB-B68B-42B3D50BAF39}"/>
+              <c16:uniqueId val="{00000003-BBF3-41FB-9C0A-D7ECDBCA6DE3}"/>
             </c:ext>
           </c:extLst>
         </c:ser>
@@ -647,11 +647,12 @@
               <a:lstStyle/>
               <a:p>
                 <a:pPr>
-                  <a:defRPr sz="900"/>
+                  <a:defRPr sz="1100"/>
                 </a:pPr>
                 <a:r>
-                  <a:rPr lang="en-US" sz="900" b="0">
-                    <a:latin typeface="LM Roman 12" panose="00000500000000000000" pitchFamily="50" charset="0"/>
+                  <a:rPr lang="en-US" sz="1100" b="0">
+                    <a:latin typeface="Cambria" panose="02040503050406030204" pitchFamily="18" charset="0"/>
+                    <a:ea typeface="Cambria" panose="02040503050406030204" pitchFamily="18" charset="0"/>
                   </a:rPr>
                   <a:t>p</a:t>
                 </a:r>
@@ -672,8 +673,9 @@
           <a:lstStyle/>
           <a:p>
             <a:pPr>
-              <a:defRPr sz="900">
-                <a:latin typeface="LM Roman 12" panose="00000500000000000000" pitchFamily="50" charset="0"/>
+              <a:defRPr sz="1100">
+                <a:latin typeface="Cambria" panose="02040503050406030204" pitchFamily="18" charset="0"/>
+                <a:ea typeface="Cambria" panose="02040503050406030204" pitchFamily="18" charset="0"/>
               </a:defRPr>
             </a:pPr>
             <a:endParaRPr lang="en-US"/>
@@ -708,11 +710,15 @@
               <a:lstStyle/>
               <a:p>
                 <a:pPr>
-                  <a:defRPr sz="900"/>
+                  <a:defRPr sz="1100">
+                    <a:latin typeface="Cambria" panose="02040503050406030204" pitchFamily="18" charset="0"/>
+                    <a:ea typeface="Cambria" panose="02040503050406030204" pitchFamily="18" charset="0"/>
+                  </a:defRPr>
                 </a:pPr>
                 <a:r>
-                  <a:rPr lang="en-US" sz="900" b="0">
-                    <a:latin typeface="LM Roman 12" panose="00000500000000000000" pitchFamily="50" charset="0"/>
+                  <a:rPr lang="en-US" sz="1100" b="0">
+                    <a:latin typeface="Cambria" panose="02040503050406030204" pitchFamily="18" charset="0"/>
+                    <a:ea typeface="Cambria" panose="02040503050406030204" pitchFamily="18" charset="0"/>
                   </a:rPr>
                   <a:t>q</a:t>
                 </a:r>
@@ -735,8 +741,9 @@
           <a:lstStyle/>
           <a:p>
             <a:pPr>
-              <a:defRPr sz="900">
-                <a:latin typeface="LM Roman 12" panose="00000500000000000000" pitchFamily="50" charset="0"/>
+              <a:defRPr sz="1100">
+                <a:latin typeface="Cambria" panose="02040503050406030204" pitchFamily="18" charset="0"/>
+                <a:ea typeface="Cambria" panose="02040503050406030204" pitchFamily="18" charset="0"/>
               </a:defRPr>
             </a:pPr>
             <a:endParaRPr lang="en-US"/>
@@ -768,8 +775,9 @@
         <a:lstStyle/>
         <a:p>
           <a:pPr>
-            <a:defRPr sz="900">
-              <a:latin typeface="LM Roman 12" panose="00000500000000000000" pitchFamily="50" charset="0"/>
+            <a:defRPr sz="1400">
+              <a:latin typeface="Cambria" panose="02040503050406030204" pitchFamily="18" charset="0"/>
+              <a:ea typeface="Cambria" panose="02040503050406030204" pitchFamily="18" charset="0"/>
             </a:defRPr>
           </a:pPr>
           <a:endParaRPr lang="en-US"/>
@@ -938,7 +946,7 @@
           <a:p>
             <a:fld id="{8E5C5D3E-682B-4EAA-ACF2-6D9406B6E335}" type="datetimeFigureOut">
               <a:rPr lang="en-US" smtClean="0"/>
-              <a:t>3/10/2020</a:t>
+              <a:t>3/11/2020</a:t>
             </a:fld>
             <a:endParaRPr lang="en-US"/>
           </a:p>
@@ -1136,7 +1144,7 @@
           <a:p>
             <a:fld id="{8E5C5D3E-682B-4EAA-ACF2-6D9406B6E335}" type="datetimeFigureOut">
               <a:rPr lang="en-US" smtClean="0"/>
-              <a:t>3/10/2020</a:t>
+              <a:t>3/11/2020</a:t>
             </a:fld>
             <a:endParaRPr lang="en-US"/>
           </a:p>
@@ -1344,7 +1352,7 @@
           <a:p>
             <a:fld id="{8E5C5D3E-682B-4EAA-ACF2-6D9406B6E335}" type="datetimeFigureOut">
               <a:rPr lang="en-US" smtClean="0"/>
-              <a:t>3/10/2020</a:t>
+              <a:t>3/11/2020</a:t>
             </a:fld>
             <a:endParaRPr lang="en-US"/>
           </a:p>
@@ -1542,7 +1550,7 @@
           <a:p>
             <a:fld id="{8E5C5D3E-682B-4EAA-ACF2-6D9406B6E335}" type="datetimeFigureOut">
               <a:rPr lang="en-US" smtClean="0"/>
-              <a:t>3/10/2020</a:t>
+              <a:t>3/11/2020</a:t>
             </a:fld>
             <a:endParaRPr lang="en-US"/>
           </a:p>
@@ -1817,7 +1825,7 @@
           <a:p>
             <a:fld id="{8E5C5D3E-682B-4EAA-ACF2-6D9406B6E335}" type="datetimeFigureOut">
               <a:rPr lang="en-US" smtClean="0"/>
-              <a:t>3/10/2020</a:t>
+              <a:t>3/11/2020</a:t>
             </a:fld>
             <a:endParaRPr lang="en-US"/>
           </a:p>
@@ -2082,7 +2090,7 @@
           <a:p>
             <a:fld id="{8E5C5D3E-682B-4EAA-ACF2-6D9406B6E335}" type="datetimeFigureOut">
               <a:rPr lang="en-US" smtClean="0"/>
-              <a:t>3/10/2020</a:t>
+              <a:t>3/11/2020</a:t>
             </a:fld>
             <a:endParaRPr lang="en-US"/>
           </a:p>
@@ -2494,7 +2502,7 @@
           <a:p>
             <a:fld id="{8E5C5D3E-682B-4EAA-ACF2-6D9406B6E335}" type="datetimeFigureOut">
               <a:rPr lang="en-US" smtClean="0"/>
-              <a:t>3/10/2020</a:t>
+              <a:t>3/11/2020</a:t>
             </a:fld>
             <a:endParaRPr lang="en-US"/>
           </a:p>
@@ -2635,7 +2643,7 @@
           <a:p>
             <a:fld id="{8E5C5D3E-682B-4EAA-ACF2-6D9406B6E335}" type="datetimeFigureOut">
               <a:rPr lang="en-US" smtClean="0"/>
-              <a:t>3/10/2020</a:t>
+              <a:t>3/11/2020</a:t>
             </a:fld>
             <a:endParaRPr lang="en-US"/>
           </a:p>
@@ -2748,7 +2756,7 @@
           <a:p>
             <a:fld id="{8E5C5D3E-682B-4EAA-ACF2-6D9406B6E335}" type="datetimeFigureOut">
               <a:rPr lang="en-US" smtClean="0"/>
-              <a:t>3/10/2020</a:t>
+              <a:t>3/11/2020</a:t>
             </a:fld>
             <a:endParaRPr lang="en-US"/>
           </a:p>
@@ -3059,7 +3067,7 @@
           <a:p>
             <a:fld id="{8E5C5D3E-682B-4EAA-ACF2-6D9406B6E335}" type="datetimeFigureOut">
               <a:rPr lang="en-US" smtClean="0"/>
-              <a:t>3/10/2020</a:t>
+              <a:t>3/11/2020</a:t>
             </a:fld>
             <a:endParaRPr lang="en-US"/>
           </a:p>
@@ -3347,7 +3355,7 @@
           <a:p>
             <a:fld id="{8E5C5D3E-682B-4EAA-ACF2-6D9406B6E335}" type="datetimeFigureOut">
               <a:rPr lang="en-US" smtClean="0"/>
-              <a:t>3/10/2020</a:t>
+              <a:t>3/11/2020</a:t>
             </a:fld>
             <a:endParaRPr lang="en-US"/>
           </a:p>
@@ -3588,7 +3596,7 @@
           <a:p>
             <a:fld id="{8E5C5D3E-682B-4EAA-ACF2-6D9406B6E335}" type="datetimeFigureOut">
               <a:rPr lang="en-US" smtClean="0"/>
-              <a:t>3/10/2020</a:t>
+              <a:t>3/11/2020</a:t>
             </a:fld>
             <a:endParaRPr lang="en-US"/>
           </a:p>
@@ -4007,7 +4015,7 @@
       </p:grpSpPr>
       <p:graphicFrame>
         <p:nvGraphicFramePr>
-          <p:cNvPr id="4" name="Chart 3">
+          <p:cNvPr id="6" name="Chart 5">
             <a:extLst>
               <a:ext uri="{FF2B5EF4-FFF2-40B4-BE49-F238E27FC236}">
                 <a16:creationId xmlns:a16="http://schemas.microsoft.com/office/drawing/2014/main" id="{62453408-EE54-41CA-AF09-AB3D1F107A0F}"/>
@@ -4020,14 +4028,14 @@
           <p:nvPr>
             <p:extLst>
               <p:ext uri="{D42A27DB-BD31-4B8C-83A1-F6EECF244321}">
-                <p14:modId xmlns:p14="http://schemas.microsoft.com/office/powerpoint/2010/main" val="2839856632"/>
+                <p14:modId xmlns:p14="http://schemas.microsoft.com/office/powerpoint/2010/main" val="3320448832"/>
               </p:ext>
             </p:extLst>
           </p:nvPr>
         </p:nvGraphicFramePr>
         <p:xfrm>
-          <a:off x="132080" y="111760"/>
-          <a:ext cx="11907520" cy="6604000"/>
+          <a:off x="172720" y="91440"/>
+          <a:ext cx="11927840" cy="6634480"/>
         </p:xfrm>
         <a:graphic>
           <a:graphicData uri="http://schemas.openxmlformats.org/drawingml/2006/chart">
@@ -4157,7 +4165,8 @@
           <a:p>
             <a:r>
               <a:rPr lang="en-US" dirty="0">
-                <a:latin typeface="LM Roman 12" panose="00000500000000000000" pitchFamily="50" charset="0"/>
+                <a:latin typeface="Cambria" panose="02040503050406030204" pitchFamily="18" charset="0"/>
+                <a:ea typeface="Cambria" panose="02040503050406030204" pitchFamily="18" charset="0"/>
               </a:rPr>
               <a:t>Regions where the Naïve Bayes classifier is not optimal</a:t>
             </a:r>

</xml_diff>